<commit_message>
ietf 117 digital map side meeting
</commit_message>
<xml_diff>
--- a/117/NETCONF/draft-ietf-netconf-udp-notif-10.pptx
+++ b/117/NETCONF/draft-ietf-netconf-udp-notif-10.pptx
@@ -116,6 +116,35 @@
 </p:presentation>
 </file>
 
+<file path=ppt/changesInfos/changesInfo1.xml><?xml version="1.0" encoding="utf-8"?>
+<pc:chgInfo xmlns:a="http://schemas.openxmlformats.org/drawingml/2006/main" xmlns:r="http://schemas.openxmlformats.org/officeDocument/2006/relationships" xmlns:ac="http://schemas.microsoft.com/office/drawing/2013/main/command" xmlns:pc="http://schemas.microsoft.com/office/powerpoint/2013/main/command">
+  <pc:docChgLst>
+    <pc:chgData name="Graf Thomas, INI-NET-VNC-HCS" userId="487bc3e3-9ce7-4cdd-b7b4-8899ea88d289" providerId="ADAL" clId="{5C50998F-FB5A-4E7B-90E4-76B621E8275C}"/>
+    <pc:docChg chg="modSld">
+      <pc:chgData name="Graf Thomas, INI-NET-VNC-HCS" userId="487bc3e3-9ce7-4cdd-b7b4-8899ea88d289" providerId="ADAL" clId="{5C50998F-FB5A-4E7B-90E4-76B621E8275C}" dt="2023-07-22T23:28:38.108" v="34" actId="21"/>
+      <pc:docMkLst>
+        <pc:docMk/>
+      </pc:docMkLst>
+      <pc:sldChg chg="modSp mod">
+        <pc:chgData name="Graf Thomas, INI-NET-VNC-HCS" userId="487bc3e3-9ce7-4cdd-b7b4-8899ea88d289" providerId="ADAL" clId="{5C50998F-FB5A-4E7B-90E4-76B621E8275C}" dt="2023-07-22T23:28:38.108" v="34" actId="21"/>
+        <pc:sldMkLst>
+          <pc:docMk/>
+          <pc:sldMk cId="505743577" sldId="2145706228"/>
+        </pc:sldMkLst>
+        <pc:spChg chg="mod">
+          <ac:chgData name="Graf Thomas, INI-NET-VNC-HCS" userId="487bc3e3-9ce7-4cdd-b7b4-8899ea88d289" providerId="ADAL" clId="{5C50998F-FB5A-4E7B-90E4-76B621E8275C}" dt="2023-07-22T23:28:38.108" v="34" actId="21"/>
+          <ac:spMkLst>
+            <pc:docMk/>
+            <pc:sldMk cId="505743577" sldId="2145706228"/>
+            <ac:spMk id="3" creationId="{29C0DFD4-432D-4B0C-93DF-790441DCF5B9}"/>
+          </ac:spMkLst>
+        </pc:spChg>
+      </pc:sldChg>
+    </pc:docChg>
+  </pc:docChgLst>
+</pc:chgInfo>
+</file>
+
 <file path=ppt/notesMasters/notesMaster1.xml><?xml version="1.0" encoding="utf-8"?>
 <p:notesMaster xmlns:a="http://schemas.openxmlformats.org/drawingml/2006/main" xmlns:r="http://schemas.openxmlformats.org/officeDocument/2006/relationships" xmlns:p="http://schemas.openxmlformats.org/presentationml/2006/main">
   <p:cSld>
@@ -198,7 +227,7 @@
           <a:p>
             <a:fld id="{E5E705E9-673F-4AC4-B29E-A7B26F3B8523}" type="datetimeFigureOut">
               <a:rPr lang="de-CH" smtClean="0"/>
-              <a:t>07.07.2023</a:t>
+              <a:t>22.07.2023</a:t>
             </a:fld>
             <a:endParaRPr lang="de-CH"/>
           </a:p>
@@ -615,7 +644,7 @@
           <a:p>
             <a:fld id="{9E9B238C-2335-4007-98C9-471C02CC43B6}" type="datetimeFigureOut">
               <a:rPr lang="de-CH" smtClean="0"/>
-              <a:t>07.07.2023</a:t>
+              <a:t>22.07.2023</a:t>
             </a:fld>
             <a:endParaRPr lang="de-CH"/>
           </a:p>
@@ -815,7 +844,7 @@
           <a:p>
             <a:fld id="{9E9B238C-2335-4007-98C9-471C02CC43B6}" type="datetimeFigureOut">
               <a:rPr lang="de-CH" smtClean="0"/>
-              <a:t>07.07.2023</a:t>
+              <a:t>22.07.2023</a:t>
             </a:fld>
             <a:endParaRPr lang="de-CH"/>
           </a:p>
@@ -1025,7 +1054,7 @@
           <a:p>
             <a:fld id="{9E9B238C-2335-4007-98C9-471C02CC43B6}" type="datetimeFigureOut">
               <a:rPr lang="de-CH" smtClean="0"/>
-              <a:t>07.07.2023</a:t>
+              <a:t>22.07.2023</a:t>
             </a:fld>
             <a:endParaRPr lang="de-CH"/>
           </a:p>
@@ -1225,7 +1254,7 @@
           <a:p>
             <a:fld id="{9E9B238C-2335-4007-98C9-471C02CC43B6}" type="datetimeFigureOut">
               <a:rPr lang="de-CH" smtClean="0"/>
-              <a:t>07.07.2023</a:t>
+              <a:t>22.07.2023</a:t>
             </a:fld>
             <a:endParaRPr lang="de-CH"/>
           </a:p>
@@ -1501,7 +1530,7 @@
           <a:p>
             <a:fld id="{9E9B238C-2335-4007-98C9-471C02CC43B6}" type="datetimeFigureOut">
               <a:rPr lang="de-CH" smtClean="0"/>
-              <a:t>07.07.2023</a:t>
+              <a:t>22.07.2023</a:t>
             </a:fld>
             <a:endParaRPr lang="de-CH"/>
           </a:p>
@@ -1769,7 +1798,7 @@
           <a:p>
             <a:fld id="{9E9B238C-2335-4007-98C9-471C02CC43B6}" type="datetimeFigureOut">
               <a:rPr lang="de-CH" smtClean="0"/>
-              <a:t>07.07.2023</a:t>
+              <a:t>22.07.2023</a:t>
             </a:fld>
             <a:endParaRPr lang="de-CH"/>
           </a:p>
@@ -2184,7 +2213,7 @@
           <a:p>
             <a:fld id="{9E9B238C-2335-4007-98C9-471C02CC43B6}" type="datetimeFigureOut">
               <a:rPr lang="de-CH" smtClean="0"/>
-              <a:t>07.07.2023</a:t>
+              <a:t>22.07.2023</a:t>
             </a:fld>
             <a:endParaRPr lang="de-CH"/>
           </a:p>
@@ -2326,7 +2355,7 @@
           <a:p>
             <a:fld id="{9E9B238C-2335-4007-98C9-471C02CC43B6}" type="datetimeFigureOut">
               <a:rPr lang="de-CH" smtClean="0"/>
-              <a:t>07.07.2023</a:t>
+              <a:t>22.07.2023</a:t>
             </a:fld>
             <a:endParaRPr lang="de-CH"/>
           </a:p>
@@ -2439,7 +2468,7 @@
           <a:p>
             <a:fld id="{9E9B238C-2335-4007-98C9-471C02CC43B6}" type="datetimeFigureOut">
               <a:rPr lang="de-CH" smtClean="0"/>
-              <a:t>07.07.2023</a:t>
+              <a:t>22.07.2023</a:t>
             </a:fld>
             <a:endParaRPr lang="de-CH"/>
           </a:p>
@@ -2752,7 +2781,7 @@
           <a:p>
             <a:fld id="{9E9B238C-2335-4007-98C9-471C02CC43B6}" type="datetimeFigureOut">
               <a:rPr lang="de-CH" smtClean="0"/>
-              <a:t>07.07.2023</a:t>
+              <a:t>22.07.2023</a:t>
             </a:fld>
             <a:endParaRPr lang="de-CH"/>
           </a:p>
@@ -3041,7 +3070,7 @@
           <a:p>
             <a:fld id="{9E9B238C-2335-4007-98C9-471C02CC43B6}" type="datetimeFigureOut">
               <a:rPr lang="de-CH" smtClean="0"/>
-              <a:t>07.07.2023</a:t>
+              <a:t>22.07.2023</a:t>
             </a:fld>
             <a:endParaRPr lang="de-CH"/>
           </a:p>
@@ -3284,7 +3313,7 @@
           <a:p>
             <a:fld id="{9E9B238C-2335-4007-98C9-471C02CC43B6}" type="datetimeFigureOut">
               <a:rPr lang="de-CH" smtClean="0"/>
-              <a:t>07.07.2023</a:t>
+              <a:t>22.07.2023</a:t>
             </a:fld>
             <a:endParaRPr lang="de-CH"/>
           </a:p>
@@ -4323,7 +4352,6 @@
               </a:rPr>
               <a:t>ditorial updates</a:t>
             </a:r>
-            <a:endParaRPr lang="en-US" sz="2000" b="1" dirty="0"/>
           </a:p>
           <a:p>
             <a:pPr marL="0" indent="0">

</xml_diff>